<commit_message>
added stuff to appendix
</commit_message>
<xml_diff>
--- a/MSc Thesis/images/introExample.pptx
+++ b/MSc Thesis/images/introExample.pptx
@@ -6,6 +6,13 @@
   </p:sldMasterIdLst>
   <p:sldIdLst>
     <p:sldId id="256" r:id="rId2"/>
+    <p:sldId id="257" r:id="rId3"/>
+    <p:sldId id="258" r:id="rId4"/>
+    <p:sldId id="259" r:id="rId5"/>
+    <p:sldId id="260" r:id="rId6"/>
+    <p:sldId id="261" r:id="rId7"/>
+    <p:sldId id="262" r:id="rId8"/>
+    <p:sldId id="263" r:id="rId9"/>
   </p:sldIdLst>
   <p:sldSz cx="12192000" cy="6858000"/>
   <p:notesSz cx="6858000" cy="9144000"/>
@@ -104,6 +111,11 @@
       </a:defRPr>
     </a:lvl9pPr>
   </p:defaultTextStyle>
+  <p:extLst>
+    <p:ext uri="{EFAFB233-063F-42B5-8137-9DF3F51BA10A}">
+      <p15:sldGuideLst xmlns:p15="http://schemas.microsoft.com/office/powerpoint/2012/main"/>
+    </p:ext>
+  </p:extLst>
 </p:presentation>
 </file>
 
@@ -238,7 +250,7 @@
           <a:p>
             <a:fld id="{7F50E83E-45E0-4DC8-85AD-F88B420F160E}" type="datetimeFigureOut">
               <a:rPr lang="en-GB" smtClean="0"/>
-              <a:t>10/10/2016</a:t>
+              <a:t>12/10/2016</a:t>
             </a:fld>
             <a:endParaRPr lang="en-GB"/>
           </a:p>
@@ -408,7 +420,7 @@
           <a:p>
             <a:fld id="{7F50E83E-45E0-4DC8-85AD-F88B420F160E}" type="datetimeFigureOut">
               <a:rPr lang="en-GB" smtClean="0"/>
-              <a:t>10/10/2016</a:t>
+              <a:t>12/10/2016</a:t>
             </a:fld>
             <a:endParaRPr lang="en-GB"/>
           </a:p>
@@ -588,7 +600,7 @@
           <a:p>
             <a:fld id="{7F50E83E-45E0-4DC8-85AD-F88B420F160E}" type="datetimeFigureOut">
               <a:rPr lang="en-GB" smtClean="0"/>
-              <a:t>10/10/2016</a:t>
+              <a:t>12/10/2016</a:t>
             </a:fld>
             <a:endParaRPr lang="en-GB"/>
           </a:p>
@@ -758,7 +770,7 @@
           <a:p>
             <a:fld id="{7F50E83E-45E0-4DC8-85AD-F88B420F160E}" type="datetimeFigureOut">
               <a:rPr lang="en-GB" smtClean="0"/>
-              <a:t>10/10/2016</a:t>
+              <a:t>12/10/2016</a:t>
             </a:fld>
             <a:endParaRPr lang="en-GB"/>
           </a:p>
@@ -1004,7 +1016,7 @@
           <a:p>
             <a:fld id="{7F50E83E-45E0-4DC8-85AD-F88B420F160E}" type="datetimeFigureOut">
               <a:rPr lang="en-GB" smtClean="0"/>
-              <a:t>10/10/2016</a:t>
+              <a:t>12/10/2016</a:t>
             </a:fld>
             <a:endParaRPr lang="en-GB"/>
           </a:p>
@@ -1236,7 +1248,7 @@
           <a:p>
             <a:fld id="{7F50E83E-45E0-4DC8-85AD-F88B420F160E}" type="datetimeFigureOut">
               <a:rPr lang="en-GB" smtClean="0"/>
-              <a:t>10/10/2016</a:t>
+              <a:t>12/10/2016</a:t>
             </a:fld>
             <a:endParaRPr lang="en-GB"/>
           </a:p>
@@ -1603,7 +1615,7 @@
           <a:p>
             <a:fld id="{7F50E83E-45E0-4DC8-85AD-F88B420F160E}" type="datetimeFigureOut">
               <a:rPr lang="en-GB" smtClean="0"/>
-              <a:t>10/10/2016</a:t>
+              <a:t>12/10/2016</a:t>
             </a:fld>
             <a:endParaRPr lang="en-GB"/>
           </a:p>
@@ -1721,7 +1733,7 @@
           <a:p>
             <a:fld id="{7F50E83E-45E0-4DC8-85AD-F88B420F160E}" type="datetimeFigureOut">
               <a:rPr lang="en-GB" smtClean="0"/>
-              <a:t>10/10/2016</a:t>
+              <a:t>12/10/2016</a:t>
             </a:fld>
             <a:endParaRPr lang="en-GB"/>
           </a:p>
@@ -1816,7 +1828,7 @@
           <a:p>
             <a:fld id="{7F50E83E-45E0-4DC8-85AD-F88B420F160E}" type="datetimeFigureOut">
               <a:rPr lang="en-GB" smtClean="0"/>
-              <a:t>10/10/2016</a:t>
+              <a:t>12/10/2016</a:t>
             </a:fld>
             <a:endParaRPr lang="en-GB"/>
           </a:p>
@@ -2093,7 +2105,7 @@
           <a:p>
             <a:fld id="{7F50E83E-45E0-4DC8-85AD-F88B420F160E}" type="datetimeFigureOut">
               <a:rPr lang="en-GB" smtClean="0"/>
-              <a:t>10/10/2016</a:t>
+              <a:t>12/10/2016</a:t>
             </a:fld>
             <a:endParaRPr lang="en-GB"/>
           </a:p>
@@ -2346,7 +2358,7 @@
           <a:p>
             <a:fld id="{7F50E83E-45E0-4DC8-85AD-F88B420F160E}" type="datetimeFigureOut">
               <a:rPr lang="en-GB" smtClean="0"/>
-              <a:t>10/10/2016</a:t>
+              <a:t>12/10/2016</a:t>
             </a:fld>
             <a:endParaRPr lang="en-GB"/>
           </a:p>
@@ -2559,7 +2571,7 @@
           <a:p>
             <a:fld id="{7F50E83E-45E0-4DC8-85AD-F88B420F160E}" type="datetimeFigureOut">
               <a:rPr lang="en-GB" smtClean="0"/>
-              <a:t>10/10/2016</a:t>
+              <a:t>12/10/2016</a:t>
             </a:fld>
             <a:endParaRPr lang="en-GB"/>
           </a:p>
@@ -3897,6 +3909,810 @@
 </p:sld>
 </file>
 
+<file path=ppt/slides/slide2.xml><?xml version="1.0" encoding="utf-8"?>
+<p:sld xmlns:a="http://schemas.openxmlformats.org/drawingml/2006/main" xmlns:r="http://schemas.openxmlformats.org/officeDocument/2006/relationships" xmlns:p="http://schemas.openxmlformats.org/presentationml/2006/main">
+  <p:cSld>
+    <p:spTree>
+      <p:nvGrpSpPr>
+        <p:cNvPr id="1" name=""/>
+        <p:cNvGrpSpPr/>
+        <p:nvPr/>
+      </p:nvGrpSpPr>
+      <p:grpSpPr>
+        <a:xfrm>
+          <a:off x="0" y="0"/>
+          <a:ext cx="0" cy="0"/>
+          <a:chOff x="0" y="0"/>
+          <a:chExt cx="0" cy="0"/>
+        </a:xfrm>
+      </p:grpSpPr>
+      <p:sp>
+        <p:nvSpPr>
+          <p:cNvPr id="13" name="Left Arrow 12"/>
+          <p:cNvSpPr/>
+          <p:nvPr/>
+        </p:nvSpPr>
+        <p:spPr>
+          <a:xfrm rot="10800000">
+            <a:off x="5593419" y="2312481"/>
+            <a:ext cx="895931" cy="403860"/>
+          </a:xfrm>
+          <a:prstGeom prst="leftArrow">
+            <a:avLst/>
+          </a:prstGeom>
+          <a:noFill/>
+          <a:ln>
+            <a:solidFill>
+              <a:schemeClr val="tx1"/>
+            </a:solidFill>
+          </a:ln>
+        </p:spPr>
+        <p:style>
+          <a:lnRef idx="2">
+            <a:schemeClr val="accent1">
+              <a:shade val="50000"/>
+            </a:schemeClr>
+          </a:lnRef>
+          <a:fillRef idx="1">
+            <a:schemeClr val="accent1"/>
+          </a:fillRef>
+          <a:effectRef idx="0">
+            <a:schemeClr val="accent1"/>
+          </a:effectRef>
+          <a:fontRef idx="minor">
+            <a:schemeClr val="lt1"/>
+          </a:fontRef>
+        </p:style>
+        <p:txBody>
+          <a:bodyPr rtlCol="0" anchor="ctr"/>
+          <a:lstStyle/>
+          <a:p>
+            <a:pPr algn="ctr"/>
+            <a:endParaRPr lang="en-GB"/>
+          </a:p>
+        </p:txBody>
+      </p:sp>
+      <p:sp>
+        <p:nvSpPr>
+          <p:cNvPr id="12" name="Left Arrow 11"/>
+          <p:cNvSpPr/>
+          <p:nvPr/>
+        </p:nvSpPr>
+        <p:spPr>
+          <a:xfrm>
+            <a:off x="3253740" y="2312481"/>
+            <a:ext cx="895931" cy="403860"/>
+          </a:xfrm>
+          <a:prstGeom prst="leftArrow">
+            <a:avLst/>
+          </a:prstGeom>
+          <a:noFill/>
+          <a:ln>
+            <a:solidFill>
+              <a:schemeClr val="tx1"/>
+            </a:solidFill>
+          </a:ln>
+        </p:spPr>
+        <p:style>
+          <a:lnRef idx="2">
+            <a:schemeClr val="accent1">
+              <a:shade val="50000"/>
+            </a:schemeClr>
+          </a:lnRef>
+          <a:fillRef idx="1">
+            <a:schemeClr val="accent1"/>
+          </a:fillRef>
+          <a:effectRef idx="0">
+            <a:schemeClr val="accent1"/>
+          </a:effectRef>
+          <a:fontRef idx="minor">
+            <a:schemeClr val="lt1"/>
+          </a:fontRef>
+        </p:style>
+        <p:txBody>
+          <a:bodyPr rtlCol="0" anchor="ctr"/>
+          <a:lstStyle/>
+          <a:p>
+            <a:pPr algn="ctr"/>
+            <a:endParaRPr lang="en-GB"/>
+          </a:p>
+        </p:txBody>
+      </p:sp>
+      <p:grpSp>
+        <p:nvGrpSpPr>
+          <p:cNvPr id="4" name="Group 3"/>
+          <p:cNvGrpSpPr/>
+          <p:nvPr/>
+        </p:nvGrpSpPr>
+        <p:grpSpPr>
+          <a:xfrm>
+            <a:off x="1083030" y="697337"/>
+            <a:ext cx="8064896" cy="4326182"/>
+            <a:chOff x="588760" y="1076278"/>
+            <a:chExt cx="8064896" cy="4326182"/>
+          </a:xfrm>
+        </p:grpSpPr>
+        <p:pic>
+          <p:nvPicPr>
+            <p:cNvPr id="5" name="Picture 2" descr="D:\Dropbox\robotics\vids\icravid\HRP-2promet.png"/>
+            <p:cNvPicPr>
+              <a:picLocks noChangeAspect="1" noChangeArrowheads="1"/>
+            </p:cNvPicPr>
+            <p:nvPr/>
+          </p:nvPicPr>
+          <p:blipFill>
+            <a:blip r:embed="rId2" cstate="print"/>
+            <a:srcRect/>
+            <a:stretch>
+              <a:fillRect/>
+            </a:stretch>
+          </p:blipFill>
+          <p:spPr bwMode="auto">
+            <a:xfrm>
+              <a:off x="588760" y="1772816"/>
+              <a:ext cx="2021535" cy="2083041"/>
+            </a:xfrm>
+            <a:prstGeom prst="rect">
+              <a:avLst/>
+            </a:prstGeom>
+            <a:noFill/>
+          </p:spPr>
+        </p:pic>
+        <p:pic>
+          <p:nvPicPr>
+            <p:cNvPr id="6" name="Picture 3" descr="D:\Dropbox\robotics\vids\icravid\Sarcos.png"/>
+            <p:cNvPicPr>
+              <a:picLocks noChangeAspect="1" noChangeArrowheads="1"/>
+            </p:cNvPicPr>
+            <p:nvPr/>
+          </p:nvPicPr>
+          <p:blipFill>
+            <a:blip r:embed="rId3" cstate="print"/>
+            <a:srcRect/>
+            <a:stretch>
+              <a:fillRect/>
+            </a:stretch>
+          </p:blipFill>
+          <p:spPr bwMode="auto">
+            <a:xfrm>
+              <a:off x="6205384" y="1916832"/>
+              <a:ext cx="2160240" cy="1953041"/>
+            </a:xfrm>
+            <a:prstGeom prst="rect">
+              <a:avLst/>
+            </a:prstGeom>
+            <a:noFill/>
+          </p:spPr>
+        </p:pic>
+        <p:sp>
+          <p:nvSpPr>
+            <p:cNvPr id="7" name="TextBox 6"/>
+            <p:cNvSpPr txBox="1"/>
+            <p:nvPr/>
+          </p:nvSpPr>
+          <p:spPr>
+            <a:xfrm>
+              <a:off x="876792" y="1196752"/>
+              <a:ext cx="1944216" cy="646331"/>
+            </a:xfrm>
+            <a:prstGeom prst="rect">
+              <a:avLst/>
+            </a:prstGeom>
+            <a:noFill/>
+          </p:spPr>
+          <p:txBody>
+            <a:bodyPr wrap="square" rtlCol="0">
+              <a:spAutoFit/>
+            </a:bodyPr>
+            <a:lstStyle/>
+            <a:p>
+              <a:r>
+                <a:rPr lang="en-GB" sz="3600" dirty="0" smtClean="0">
+                  <a:latin typeface="+mj-lt"/>
+                </a:rPr>
+                <a:t>External</a:t>
+              </a:r>
+              <a:endParaRPr lang="en-GB" sz="3600" dirty="0">
+                <a:latin typeface="+mj-lt"/>
+              </a:endParaRPr>
+            </a:p>
+          </p:txBody>
+        </p:sp>
+        <p:sp>
+          <p:nvSpPr>
+            <p:cNvPr id="8" name="TextBox 7"/>
+            <p:cNvSpPr txBox="1"/>
+            <p:nvPr/>
+          </p:nvSpPr>
+          <p:spPr>
+            <a:xfrm>
+              <a:off x="6565424" y="1198493"/>
+              <a:ext cx="2088232" cy="646331"/>
+            </a:xfrm>
+            <a:prstGeom prst="rect">
+              <a:avLst/>
+            </a:prstGeom>
+            <a:noFill/>
+          </p:spPr>
+          <p:txBody>
+            <a:bodyPr wrap="square" rtlCol="0">
+              <a:spAutoFit/>
+            </a:bodyPr>
+            <a:lstStyle/>
+            <a:p>
+              <a:r>
+                <a:rPr lang="en-GB" sz="3600" dirty="0" smtClean="0">
+                  <a:latin typeface="+mj-lt"/>
+                </a:rPr>
+                <a:t>Wearable</a:t>
+              </a:r>
+              <a:endParaRPr lang="en-GB" sz="3600" dirty="0">
+                <a:latin typeface="+mj-lt"/>
+              </a:endParaRPr>
+            </a:p>
+          </p:txBody>
+        </p:sp>
+        <p:grpSp>
+          <p:nvGrpSpPr>
+            <p:cNvPr id="9" name="Group 8"/>
+            <p:cNvGrpSpPr/>
+            <p:nvPr/>
+          </p:nvGrpSpPr>
+          <p:grpSpPr>
+            <a:xfrm>
+              <a:off x="3373645" y="1076278"/>
+              <a:ext cx="2255675" cy="4326182"/>
+              <a:chOff x="3396445" y="1292302"/>
+              <a:chExt cx="2255675" cy="4326182"/>
+            </a:xfrm>
+          </p:grpSpPr>
+          <p:sp>
+            <p:nvSpPr>
+              <p:cNvPr id="11" name="TextBox 10"/>
+              <p:cNvSpPr txBox="1"/>
+              <p:nvPr/>
+            </p:nvSpPr>
+            <p:spPr>
+              <a:xfrm>
+                <a:off x="3491880" y="1292302"/>
+                <a:ext cx="2160240" cy="646331"/>
+              </a:xfrm>
+              <a:prstGeom prst="rect">
+                <a:avLst/>
+              </a:prstGeom>
+              <a:noFill/>
+            </p:spPr>
+            <p:txBody>
+              <a:bodyPr wrap="square" rtlCol="0">
+                <a:spAutoFit/>
+              </a:bodyPr>
+              <a:lstStyle/>
+              <a:p>
+                <a:r>
+                  <a:rPr lang="en-GB" sz="3600" dirty="0" smtClean="0">
+                    <a:latin typeface="+mj-lt"/>
+                  </a:rPr>
+                  <a:t>Handheld</a:t>
+                </a:r>
+                <a:endParaRPr lang="en-GB" sz="3600" dirty="0">
+                  <a:latin typeface="+mj-lt"/>
+                </a:endParaRPr>
+              </a:p>
+            </p:txBody>
+          </p:sp>
+          <p:pic>
+            <p:nvPicPr>
+              <p:cNvPr id="10" name="Picture 4" descr="D:\Dropbox\robotics\reports\ICRA2015\Images\Diagram1.jpg"/>
+              <p:cNvPicPr>
+                <a:picLocks noChangeAspect="1" noChangeArrowheads="1"/>
+              </p:cNvPicPr>
+              <p:nvPr/>
+            </p:nvPicPr>
+            <p:blipFill>
+              <a:blip r:embed="rId4" cstate="print"/>
+              <a:srcRect/>
+              <a:stretch>
+                <a:fillRect/>
+              </a:stretch>
+            </p:blipFill>
+            <p:spPr bwMode="auto">
+              <a:xfrm>
+                <a:off x="3396445" y="2097018"/>
+                <a:ext cx="2068388" cy="3521466"/>
+              </a:xfrm>
+              <a:prstGeom prst="rect">
+                <a:avLst/>
+              </a:prstGeom>
+              <a:noFill/>
+            </p:spPr>
+          </p:pic>
+        </p:grpSp>
+      </p:grpSp>
+    </p:spTree>
+    <p:extLst>
+      <p:ext uri="{BB962C8B-B14F-4D97-AF65-F5344CB8AC3E}">
+        <p14:creationId xmlns:p14="http://schemas.microsoft.com/office/powerpoint/2010/main" val="3646071310"/>
+      </p:ext>
+    </p:extLst>
+  </p:cSld>
+  <p:clrMapOvr>
+    <a:masterClrMapping/>
+  </p:clrMapOvr>
+</p:sld>
+</file>
+
+<file path=ppt/slides/slide3.xml><?xml version="1.0" encoding="utf-8"?>
+<p:sld xmlns:a="http://schemas.openxmlformats.org/drawingml/2006/main" xmlns:r="http://schemas.openxmlformats.org/officeDocument/2006/relationships" xmlns:p="http://schemas.openxmlformats.org/presentationml/2006/main">
+  <p:cSld>
+    <p:spTree>
+      <p:nvGrpSpPr>
+        <p:cNvPr id="1" name=""/>
+        <p:cNvGrpSpPr/>
+        <p:nvPr/>
+      </p:nvGrpSpPr>
+      <p:grpSpPr>
+        <a:xfrm>
+          <a:off x="0" y="0"/>
+          <a:ext cx="0" cy="0"/>
+          <a:chOff x="0" y="0"/>
+          <a:chExt cx="0" cy="0"/>
+        </a:xfrm>
+      </p:grpSpPr>
+      <p:pic>
+        <p:nvPicPr>
+          <p:cNvPr id="4" name="Picture 3"/>
+          <p:cNvPicPr>
+            <a:picLocks noChangeAspect="1"/>
+          </p:cNvPicPr>
+          <p:nvPr/>
+        </p:nvPicPr>
+        <p:blipFill>
+          <a:blip r:embed="rId2"/>
+          <a:stretch>
+            <a:fillRect/>
+          </a:stretch>
+        </p:blipFill>
+        <p:spPr>
+          <a:xfrm>
+            <a:off x="4391025" y="3328987"/>
+            <a:ext cx="3409950" cy="200025"/>
+          </a:xfrm>
+          <a:prstGeom prst="rect">
+            <a:avLst/>
+          </a:prstGeom>
+          <a:ln w="9525">
+            <a:solidFill>
+              <a:schemeClr val="tx1"/>
+            </a:solidFill>
+          </a:ln>
+        </p:spPr>
+      </p:pic>
+      <p:pic>
+        <p:nvPicPr>
+          <p:cNvPr id="5" name="Picture 4"/>
+          <p:cNvPicPr>
+            <a:picLocks noChangeAspect="1"/>
+          </p:cNvPicPr>
+          <p:nvPr/>
+        </p:nvPicPr>
+        <p:blipFill>
+          <a:blip r:embed="rId3"/>
+          <a:stretch>
+            <a:fillRect/>
+          </a:stretch>
+        </p:blipFill>
+        <p:spPr>
+          <a:xfrm>
+            <a:off x="4391025" y="910776"/>
+            <a:ext cx="3409950" cy="2418211"/>
+          </a:xfrm>
+          <a:prstGeom prst="rect">
+            <a:avLst/>
+          </a:prstGeom>
+        </p:spPr>
+      </p:pic>
+    </p:spTree>
+    <p:extLst>
+      <p:ext uri="{BB962C8B-B14F-4D97-AF65-F5344CB8AC3E}">
+        <p14:creationId xmlns:p14="http://schemas.microsoft.com/office/powerpoint/2010/main" val="1587904024"/>
+      </p:ext>
+    </p:extLst>
+  </p:cSld>
+  <p:clrMapOvr>
+    <a:masterClrMapping/>
+  </p:clrMapOvr>
+</p:sld>
+</file>
+
+<file path=ppt/slides/slide4.xml><?xml version="1.0" encoding="utf-8"?>
+<p:sld xmlns:a="http://schemas.openxmlformats.org/drawingml/2006/main" xmlns:r="http://schemas.openxmlformats.org/officeDocument/2006/relationships" xmlns:p="http://schemas.openxmlformats.org/presentationml/2006/main">
+  <p:cSld>
+    <p:spTree>
+      <p:nvGrpSpPr>
+        <p:cNvPr id="1" name=""/>
+        <p:cNvGrpSpPr/>
+        <p:nvPr/>
+      </p:nvGrpSpPr>
+      <p:grpSpPr>
+        <a:xfrm>
+          <a:off x="0" y="0"/>
+          <a:ext cx="0" cy="0"/>
+          <a:chOff x="0" y="0"/>
+          <a:chExt cx="0" cy="0"/>
+        </a:xfrm>
+      </p:grpSpPr>
+      <p:pic>
+        <p:nvPicPr>
+          <p:cNvPr id="4" name="Picture 3"/>
+          <p:cNvPicPr>
+            <a:picLocks noChangeAspect="1"/>
+          </p:cNvPicPr>
+          <p:nvPr/>
+        </p:nvPicPr>
+        <p:blipFill>
+          <a:blip r:embed="rId2"/>
+          <a:stretch>
+            <a:fillRect/>
+          </a:stretch>
+        </p:blipFill>
+        <p:spPr>
+          <a:xfrm>
+            <a:off x="2877523" y="4105275"/>
+            <a:ext cx="3940801" cy="2395116"/>
+          </a:xfrm>
+          <a:prstGeom prst="rect">
+            <a:avLst/>
+          </a:prstGeom>
+        </p:spPr>
+      </p:pic>
+      <p:pic>
+        <p:nvPicPr>
+          <p:cNvPr id="5" name="Picture 4"/>
+          <p:cNvPicPr>
+            <a:picLocks noChangeAspect="1"/>
+          </p:cNvPicPr>
+          <p:nvPr/>
+        </p:nvPicPr>
+        <p:blipFill>
+          <a:blip r:embed="rId3"/>
+          <a:stretch>
+            <a:fillRect/>
+          </a:stretch>
+        </p:blipFill>
+        <p:spPr>
+          <a:xfrm>
+            <a:off x="2876550" y="828675"/>
+            <a:ext cx="3941774" cy="3276600"/>
+          </a:xfrm>
+          <a:prstGeom prst="rect">
+            <a:avLst/>
+          </a:prstGeom>
+        </p:spPr>
+      </p:pic>
+    </p:spTree>
+    <p:extLst>
+      <p:ext uri="{BB962C8B-B14F-4D97-AF65-F5344CB8AC3E}">
+        <p14:creationId xmlns:p14="http://schemas.microsoft.com/office/powerpoint/2010/main" val="1419858289"/>
+      </p:ext>
+    </p:extLst>
+  </p:cSld>
+  <p:clrMapOvr>
+    <a:masterClrMapping/>
+  </p:clrMapOvr>
+</p:sld>
+</file>
+
+<file path=ppt/slides/slide5.xml><?xml version="1.0" encoding="utf-8"?>
+<p:sld xmlns:a="http://schemas.openxmlformats.org/drawingml/2006/main" xmlns:r="http://schemas.openxmlformats.org/officeDocument/2006/relationships" xmlns:p="http://schemas.openxmlformats.org/presentationml/2006/main">
+  <p:cSld>
+    <p:spTree>
+      <p:nvGrpSpPr>
+        <p:cNvPr id="1" name=""/>
+        <p:cNvGrpSpPr/>
+        <p:nvPr/>
+      </p:nvGrpSpPr>
+      <p:grpSpPr>
+        <a:xfrm>
+          <a:off x="0" y="0"/>
+          <a:ext cx="0" cy="0"/>
+          <a:chOff x="0" y="0"/>
+          <a:chExt cx="0" cy="0"/>
+        </a:xfrm>
+      </p:grpSpPr>
+      <p:pic>
+        <p:nvPicPr>
+          <p:cNvPr id="4" name="Picture 3"/>
+          <p:cNvPicPr>
+            <a:picLocks noChangeAspect="1"/>
+          </p:cNvPicPr>
+          <p:nvPr/>
+        </p:nvPicPr>
+        <p:blipFill>
+          <a:blip r:embed="rId2"/>
+          <a:stretch>
+            <a:fillRect/>
+          </a:stretch>
+        </p:blipFill>
+        <p:spPr>
+          <a:xfrm>
+            <a:off x="5432583" y="1319212"/>
+            <a:ext cx="3890963" cy="4018635"/>
+          </a:xfrm>
+          <a:prstGeom prst="rect">
+            <a:avLst/>
+          </a:prstGeom>
+        </p:spPr>
+      </p:pic>
+      <p:pic>
+        <p:nvPicPr>
+          <p:cNvPr id="5" name="Picture 4"/>
+          <p:cNvPicPr>
+            <a:picLocks noChangeAspect="1"/>
+          </p:cNvPicPr>
+          <p:nvPr/>
+        </p:nvPicPr>
+        <p:blipFill rotWithShape="1">
+          <a:blip r:embed="rId3"/>
+          <a:srcRect r="44918"/>
+          <a:stretch/>
+        </p:blipFill>
+        <p:spPr>
+          <a:xfrm>
+            <a:off x="1963102" y="1319212"/>
+            <a:ext cx="3509963" cy="4000500"/>
+          </a:xfrm>
+          <a:prstGeom prst="rect">
+            <a:avLst/>
+          </a:prstGeom>
+        </p:spPr>
+      </p:pic>
+    </p:spTree>
+    <p:extLst>
+      <p:ext uri="{BB962C8B-B14F-4D97-AF65-F5344CB8AC3E}">
+        <p14:creationId xmlns:p14="http://schemas.microsoft.com/office/powerpoint/2010/main" val="3607625585"/>
+      </p:ext>
+    </p:extLst>
+  </p:cSld>
+  <p:clrMapOvr>
+    <a:masterClrMapping/>
+  </p:clrMapOvr>
+</p:sld>
+</file>
+
+<file path=ppt/slides/slide6.xml><?xml version="1.0" encoding="utf-8"?>
+<p:sld xmlns:a="http://schemas.openxmlformats.org/drawingml/2006/main" xmlns:r="http://schemas.openxmlformats.org/officeDocument/2006/relationships" xmlns:p="http://schemas.openxmlformats.org/presentationml/2006/main">
+  <p:cSld>
+    <p:spTree>
+      <p:nvGrpSpPr>
+        <p:cNvPr id="1" name=""/>
+        <p:cNvGrpSpPr/>
+        <p:nvPr/>
+      </p:nvGrpSpPr>
+      <p:grpSpPr>
+        <a:xfrm>
+          <a:off x="0" y="0"/>
+          <a:ext cx="0" cy="0"/>
+          <a:chOff x="0" y="0"/>
+          <a:chExt cx="0" cy="0"/>
+        </a:xfrm>
+      </p:grpSpPr>
+      <p:pic>
+        <p:nvPicPr>
+          <p:cNvPr id="4" name="Picture 3"/>
+          <p:cNvPicPr>
+            <a:picLocks noChangeAspect="1"/>
+          </p:cNvPicPr>
+          <p:nvPr/>
+        </p:nvPicPr>
+        <p:blipFill>
+          <a:blip r:embed="rId2"/>
+          <a:stretch>
+            <a:fillRect/>
+          </a:stretch>
+        </p:blipFill>
+        <p:spPr>
+          <a:xfrm>
+            <a:off x="3281362" y="647700"/>
+            <a:ext cx="4438650" cy="3467100"/>
+          </a:xfrm>
+          <a:prstGeom prst="rect">
+            <a:avLst/>
+          </a:prstGeom>
+        </p:spPr>
+      </p:pic>
+      <p:pic>
+        <p:nvPicPr>
+          <p:cNvPr id="5" name="Picture 4"/>
+          <p:cNvPicPr>
+            <a:picLocks noChangeAspect="1"/>
+          </p:cNvPicPr>
+          <p:nvPr/>
+        </p:nvPicPr>
+        <p:blipFill>
+          <a:blip r:embed="rId3"/>
+          <a:stretch>
+            <a:fillRect/>
+          </a:stretch>
+        </p:blipFill>
+        <p:spPr>
+          <a:xfrm>
+            <a:off x="3281362" y="4114800"/>
+            <a:ext cx="4615920" cy="1485900"/>
+          </a:xfrm>
+          <a:prstGeom prst="rect">
+            <a:avLst/>
+          </a:prstGeom>
+        </p:spPr>
+      </p:pic>
+    </p:spTree>
+    <p:extLst>
+      <p:ext uri="{BB962C8B-B14F-4D97-AF65-F5344CB8AC3E}">
+        <p14:creationId xmlns:p14="http://schemas.microsoft.com/office/powerpoint/2010/main" val="665798433"/>
+      </p:ext>
+    </p:extLst>
+  </p:cSld>
+  <p:clrMapOvr>
+    <a:masterClrMapping/>
+  </p:clrMapOvr>
+</p:sld>
+</file>
+
+<file path=ppt/slides/slide7.xml><?xml version="1.0" encoding="utf-8"?>
+<p:sld xmlns:a="http://schemas.openxmlformats.org/drawingml/2006/main" xmlns:r="http://schemas.openxmlformats.org/officeDocument/2006/relationships" xmlns:p="http://schemas.openxmlformats.org/presentationml/2006/main">
+  <p:cSld>
+    <p:spTree>
+      <p:nvGrpSpPr>
+        <p:cNvPr id="1" name=""/>
+        <p:cNvGrpSpPr/>
+        <p:nvPr/>
+      </p:nvGrpSpPr>
+      <p:grpSpPr>
+        <a:xfrm>
+          <a:off x="0" y="0"/>
+          <a:ext cx="0" cy="0"/>
+          <a:chOff x="0" y="0"/>
+          <a:chExt cx="0" cy="0"/>
+        </a:xfrm>
+      </p:grpSpPr>
+      <p:pic>
+        <p:nvPicPr>
+          <p:cNvPr id="4" name="Picture 3"/>
+          <p:cNvPicPr>
+            <a:picLocks noChangeAspect="1"/>
+          </p:cNvPicPr>
+          <p:nvPr/>
+        </p:nvPicPr>
+        <p:blipFill>
+          <a:blip r:embed="rId2"/>
+          <a:stretch>
+            <a:fillRect/>
+          </a:stretch>
+        </p:blipFill>
+        <p:spPr>
+          <a:xfrm>
+            <a:off x="3376612" y="1019174"/>
+            <a:ext cx="3738391" cy="2924175"/>
+          </a:xfrm>
+          <a:prstGeom prst="rect">
+            <a:avLst/>
+          </a:prstGeom>
+        </p:spPr>
+      </p:pic>
+      <p:pic>
+        <p:nvPicPr>
+          <p:cNvPr id="5" name="Picture 4"/>
+          <p:cNvPicPr>
+            <a:picLocks noChangeAspect="1"/>
+          </p:cNvPicPr>
+          <p:nvPr/>
+        </p:nvPicPr>
+        <p:blipFill>
+          <a:blip r:embed="rId3"/>
+          <a:stretch>
+            <a:fillRect/>
+          </a:stretch>
+        </p:blipFill>
+        <p:spPr>
+          <a:xfrm>
+            <a:off x="3343103" y="3943349"/>
+            <a:ext cx="3771900" cy="1857375"/>
+          </a:xfrm>
+          <a:prstGeom prst="rect">
+            <a:avLst/>
+          </a:prstGeom>
+        </p:spPr>
+      </p:pic>
+    </p:spTree>
+    <p:extLst>
+      <p:ext uri="{BB962C8B-B14F-4D97-AF65-F5344CB8AC3E}">
+        <p14:creationId xmlns:p14="http://schemas.microsoft.com/office/powerpoint/2010/main" val="3880040947"/>
+      </p:ext>
+    </p:extLst>
+  </p:cSld>
+  <p:clrMapOvr>
+    <a:masterClrMapping/>
+  </p:clrMapOvr>
+</p:sld>
+</file>
+
+<file path=ppt/slides/slide8.xml><?xml version="1.0" encoding="utf-8"?>
+<p:sld xmlns:a="http://schemas.openxmlformats.org/drawingml/2006/main" xmlns:r="http://schemas.openxmlformats.org/officeDocument/2006/relationships" xmlns:p="http://schemas.openxmlformats.org/presentationml/2006/main">
+  <p:cSld>
+    <p:spTree>
+      <p:nvGrpSpPr>
+        <p:cNvPr id="1" name=""/>
+        <p:cNvGrpSpPr/>
+        <p:nvPr/>
+      </p:nvGrpSpPr>
+      <p:grpSpPr>
+        <a:xfrm>
+          <a:off x="0" y="0"/>
+          <a:ext cx="0" cy="0"/>
+          <a:chOff x="0" y="0"/>
+          <a:chExt cx="0" cy="0"/>
+        </a:xfrm>
+      </p:grpSpPr>
+      <p:pic>
+        <p:nvPicPr>
+          <p:cNvPr id="4" name="Picture 3"/>
+          <p:cNvPicPr>
+            <a:picLocks noChangeAspect="1"/>
+          </p:cNvPicPr>
+          <p:nvPr/>
+        </p:nvPicPr>
+        <p:blipFill>
+          <a:blip r:embed="rId2"/>
+          <a:stretch>
+            <a:fillRect/>
+          </a:stretch>
+        </p:blipFill>
+        <p:spPr>
+          <a:xfrm>
+            <a:off x="6505575" y="857250"/>
+            <a:ext cx="5445521" cy="4857750"/>
+          </a:xfrm>
+          <a:prstGeom prst="rect">
+            <a:avLst/>
+          </a:prstGeom>
+        </p:spPr>
+      </p:pic>
+      <p:pic>
+        <p:nvPicPr>
+          <p:cNvPr id="5" name="Picture 4"/>
+          <p:cNvPicPr>
+            <a:picLocks noChangeAspect="1"/>
+          </p:cNvPicPr>
+          <p:nvPr/>
+        </p:nvPicPr>
+        <p:blipFill>
+          <a:blip r:embed="rId3"/>
+          <a:stretch>
+            <a:fillRect/>
+          </a:stretch>
+        </p:blipFill>
+        <p:spPr>
+          <a:xfrm>
+            <a:off x="295275" y="857250"/>
+            <a:ext cx="6210300" cy="4857750"/>
+          </a:xfrm>
+          <a:prstGeom prst="rect">
+            <a:avLst/>
+          </a:prstGeom>
+        </p:spPr>
+      </p:pic>
+    </p:spTree>
+    <p:extLst>
+      <p:ext uri="{BB962C8B-B14F-4D97-AF65-F5344CB8AC3E}">
+        <p14:creationId xmlns:p14="http://schemas.microsoft.com/office/powerpoint/2010/main" val="2910386015"/>
+      </p:ext>
+    </p:extLst>
+  </p:cSld>
+  <p:clrMapOvr>
+    <a:masterClrMapping/>
+  </p:clrMapOvr>
+</p:sld>
+</file>
+
 <file path=ppt/theme/theme1.xml><?xml version="1.0" encoding="utf-8"?>
 <a:theme xmlns:a="http://schemas.openxmlformats.org/drawingml/2006/main" name="Office Theme">
   <a:themeElements>

</xml_diff>